<commit_message>
keeping other elements (images too\!)
</commit_message>
<xml_diff>
--- a/examples/basic/report.pptx
+++ b/examples/basic/report.pptx
@@ -3090,7 +3090,7 @@
       <p:grpSpPr/>
       <p:pic>
         <p:nvPicPr>
-          <p:cNvPr id="2" name="Picture 1" descr="tmpnjyhjcm9.png"/>
+          <p:cNvPr id="2" name="Picture 1" descr="tmp7sehulpo.png"/>
           <p:cNvPicPr>
             <a:picLocks noChangeAspect="1"/>
           </p:cNvPicPr>
@@ -3105,7 +3105,7 @@
         <p:spPr>
           <a:xfrm>
             <a:off x="1188720" y="274320"/>
-            <a:ext cx="2011680" cy="2103120"/>
+            <a:ext cx="2010960" cy="2102437"/>
           </a:xfrm>
           <a:prstGeom prst="rect">
             <a:avLst/>
@@ -3114,7 +3114,7 @@
       </p:pic>
       <p:pic>
         <p:nvPicPr>
-          <p:cNvPr id="3" name="Picture 2" descr="tmpetebsckq.png"/>
+          <p:cNvPr id="3" name="Picture 2" descr="tmpse6avld2.png"/>
           <p:cNvPicPr>
             <a:picLocks noChangeAspect="1"/>
           </p:cNvPicPr>
@@ -3129,7 +3129,7 @@
         <p:spPr>
           <a:xfrm>
             <a:off x="4937760" y="3017520"/>
-            <a:ext cx="4389120" cy="2286000"/>
+            <a:ext cx="4388400" cy="2284895"/>
           </a:xfrm>
           <a:prstGeom prst="rect">
             <a:avLst/>
@@ -3138,7 +3138,7 @@
       </p:pic>
       <p:pic>
         <p:nvPicPr>
-          <p:cNvPr id="4" name="Picture 3" descr="tmpvu01ed69.png"/>
+          <p:cNvPr id="4" name="Picture 3" descr="tmpe4x8e697.png"/>
           <p:cNvPicPr>
             <a:picLocks noChangeAspect="1"/>
           </p:cNvPicPr>
@@ -3153,7 +3153,108 @@
         <p:spPr>
           <a:xfrm>
             <a:off x="7406640" y="182880"/>
-            <a:ext cx="2468880" cy="1737360"/>
+            <a:ext cx="2468160" cy="1736402"/>
+          </a:xfrm>
+          <a:prstGeom prst="rect">
+            <a:avLst/>
+          </a:prstGeom>
+        </p:spPr>
+      </p:pic>
+      <p:sp>
+        <p:nvSpPr>
+          <p:cNvPr id="41" name="CustomShape 4"/>
+          <p:cNvSpPr/>
+          <p:nvPr/>
+        </p:nvSpPr>
+        <p:spPr>
+          <a:xfrm>
+            <a:off x="4114800" y="731520"/>
+            <a:ext cx="2834280" cy="1279800"/>
+          </a:xfrm>
+          <a:prstGeom prst="wedgeRoundRectCallout">
+            <a:avLst>
+              <a:gd name="adj1" fmla="val -26916"/>
+              <a:gd name="adj2" fmla="val 78731"/>
+              <a:gd name="adj3" fmla="val 16667"/>
+            </a:avLst>
+          </a:prstGeom>
+          <a:solidFill>
+            <a:srgbClr val="ed1c24"/>
+          </a:solidFill>
+          <a:ln>
+            <a:solidFill>
+              <a:srgbClr val="3465a4"/>
+            </a:solidFill>
+          </a:ln>
+        </p:spPr>
+        <p:style>
+          <a:lnRef idx="0"/>
+          <a:fillRef idx="0"/>
+          <a:effectRef idx="0"/>
+          <a:fontRef idx="minor"/>
+        </p:style>
+        <p:txBody>
+          <a:bodyPr wrap="none" lIns="90000" rIns="90000" tIns="45000" bIns="45000" anchor="ctr"/>
+          <a:p>
+            <a:pPr algn="ctr">
+              <a:lnSpc>
+                <a:spcPct val="100000"/>
+              </a:lnSpc>
+            </a:pPr>
+            <a:r>
+              <a:rPr b="0" lang="en-US" sz="1800" spc="-1" strike="noStrike">
+                <a:solidFill>
+                  <a:srgbClr val="000000"/>
+                </a:solidFill>
+                <a:latin typeface="Arial"/>
+                <a:ea typeface="DejaVu Sans"/>
+              </a:rPr>
+              <a:t>HELLO WORLD</a:t>
+            </a:r>
+            <a:endParaRPr b="0" lang="en-US" sz="1800" spc="-1" strike="noStrike">
+              <a:latin typeface="Arial"/>
+            </a:endParaRPr>
+          </a:p>
+          <a:p>
+            <a:pPr algn="ctr">
+              <a:lnSpc>
+                <a:spcPct val="100000"/>
+              </a:lnSpc>
+            </a:pPr>
+            <a:r>
+              <a:rPr b="0" lang="en-US" sz="1800" spc="-1" strike="noStrike">
+                <a:solidFill>
+                  <a:srgbClr val="000000"/>
+                </a:solidFill>
+                <a:latin typeface="Arial"/>
+                <a:ea typeface="DejaVu Sans"/>
+              </a:rPr>
+              <a:t>This text should stay</a:t>
+            </a:r>
+            <a:endParaRPr b="0" lang="en-US" sz="1800" spc="-1" strike="noStrike">
+              <a:latin typeface="Arial"/>
+            </a:endParaRPr>
+          </a:p>
+        </p:txBody>
+      </p:sp>
+      <p:pic>
+        <p:nvPicPr>
+          <p:cNvPr id="42" name="Picture 41" descr="tmpqfounqen"/>
+          <p:cNvPicPr>
+            <a:picLocks noChangeAspect="1"/>
+          </p:cNvPicPr>
+          <p:nvPr/>
+        </p:nvPicPr>
+        <p:blipFill>
+          <a:blip r:embed="rId5"/>
+          <a:stretch>
+            <a:fillRect/>
+          </a:stretch>
+        </p:blipFill>
+        <p:spPr>
+          <a:xfrm>
+            <a:off x="287280" y="3749040"/>
+            <a:ext cx="1724400" cy="1652760"/>
           </a:xfrm>
           <a:prstGeom prst="rect">
             <a:avLst/>

</xml_diff>

<commit_message>
package fixes and basic readme
</commit_message>
<xml_diff>
--- a/examples/basic/report.pptx
+++ b/examples/basic/report.pptx
@@ -3090,7 +3090,7 @@
       <p:grpSpPr/>
       <p:pic>
         <p:nvPicPr>
-          <p:cNvPr id="2" name="Picture 1" descr="tmp79jxe48x.png"/>
+          <p:cNvPr id="2" name="Picture 1" descr="tmp9idkv8wy.png"/>
           <p:cNvPicPr>
             <a:picLocks noChangeAspect="1"/>
           </p:cNvPicPr>
@@ -3114,7 +3114,7 @@
       </p:pic>
       <p:pic>
         <p:nvPicPr>
-          <p:cNvPr id="3" name="Picture 2" descr="tmpjfm23xef.png"/>
+          <p:cNvPr id="3" name="Picture 2" descr="tmpuja6q150.png"/>
           <p:cNvPicPr>
             <a:picLocks noChangeAspect="1"/>
           </p:cNvPicPr>
@@ -3138,7 +3138,7 @@
       </p:pic>
       <p:pic>
         <p:nvPicPr>
-          <p:cNvPr id="4" name="Picture 3" descr="tmpjuust0tb.png"/>
+          <p:cNvPr id="4" name="Picture 3" descr="tmpwn8hdicu.png"/>
           <p:cNvPicPr>
             <a:picLocks noChangeAspect="1"/>
           </p:cNvPicPr>
@@ -3162,7 +3162,7 @@
       </p:pic>
       <p:sp>
         <p:nvSpPr>
-          <p:cNvPr id="39" name="CustomShape 4"/>
+          <p:cNvPr id="41" name="CustomShape 4"/>
           <p:cNvSpPr/>
           <p:nvPr/>
         </p:nvSpPr>
@@ -3209,7 +3209,7 @@
       </p:sp>
       <p:pic>
         <p:nvPicPr>
-          <p:cNvPr id="40" name="Picture 39" descr="tmpg3xnw8dr"/>
+          <p:cNvPr id="42" name="Picture 41" descr="tmp450tdx7l"/>
           <p:cNvPicPr>
             <a:picLocks noChangeAspect="1"/>
           </p:cNvPicPr>
@@ -3233,7 +3233,7 @@
       </p:pic>
       <p:sp>
         <p:nvSpPr>
-          <p:cNvPr id="41" name="CustomShape 5"/>
+          <p:cNvPr id="43" name="CustomShape 5"/>
           <p:cNvSpPr/>
           <p:nvPr/>
         </p:nvSpPr>

</xml_diff>